<commit_message>
change wechat 2 QQ group
</commit_message>
<xml_diff>
--- a/slides/instruction/introduction.pptx
+++ b/slides/instruction/introduction.pptx
@@ -4630,33 +4630,70 @@
       </dgm:t>
     </dgm:pt>
     <dgm:pt modelId="{C22B14A1-CEB5-4C85-A079-329A0D631FC4}">
-      <dgm:prSet phldrT="[Text]"/>
+      <dgm:prSet phldrT="[Text]" custT="1"/>
       <dgm:spPr/>
       <dgm:t>
         <a:bodyPr/>
         <a:lstStyle/>
         <a:p>
           <a:r>
-            <a:rPr lang="en-US" altLang="zh-CN" dirty="0">
+            <a:rPr lang="en-US" altLang="zh-CN" sz="1200" dirty="0">
               <a:latin typeface="微软雅黑" panose="020B0503020204020204" pitchFamily="34" charset="-122"/>
               <a:ea typeface="微软雅黑" panose="020B0503020204020204" pitchFamily="34" charset="-122"/>
             </a:rPr>
-            <a:t>WeChat Group: </a:t>
+            <a:t>QQ group: </a:t>
           </a:r>
           <a:br>
-            <a:rPr lang="en-US" altLang="zh-CN" dirty="0">
+            <a:rPr lang="en-US" altLang="zh-CN" sz="1200" dirty="0">
               <a:latin typeface="微软雅黑" panose="020B0503020204020204" pitchFamily="34" charset="-122"/>
               <a:ea typeface="微软雅黑" panose="020B0503020204020204" pitchFamily="34" charset="-122"/>
             </a:rPr>
           </a:br>
           <a:r>
-            <a:rPr lang="en-US" altLang="zh-CN" dirty="0">
+            <a:rPr lang="en-US" altLang="zh-CN" sz="1000" dirty="0">
               <a:latin typeface="微软雅黑" panose="020B0503020204020204" pitchFamily="34" charset="-122"/>
               <a:ea typeface="微软雅黑" panose="020B0503020204020204" pitchFamily="34" charset="-122"/>
             </a:rPr>
-            <a:t>programming windows 2020</a:t>
+            <a:t>20201021076《Windows</a:t>
           </a:r>
-          <a:endParaRPr lang="en-US" dirty="0"/>
+          <a:r>
+            <a:rPr lang="zh-CN" altLang="zh-CN" sz="1000" dirty="0">
+              <a:latin typeface="微软雅黑" panose="020B0503020204020204" pitchFamily="34" charset="-122"/>
+              <a:ea typeface="微软雅黑" panose="020B0503020204020204" pitchFamily="34" charset="-122"/>
+            </a:rPr>
+            <a:t>原理与应用</a:t>
+          </a:r>
+          <a:r>
+            <a:rPr lang="en-US" altLang="zh-CN" sz="1000" dirty="0">
+              <a:latin typeface="微软雅黑" panose="020B0503020204020204" pitchFamily="34" charset="-122"/>
+              <a:ea typeface="微软雅黑" panose="020B0503020204020204" pitchFamily="34" charset="-122"/>
+            </a:rPr>
+            <a:t>》</a:t>
+          </a:r>
+        </a:p>
+        <a:p>
+          <a:r>
+            <a:rPr lang="en-US" altLang="zh-CN" sz="1000" dirty="0">
+              <a:latin typeface="微软雅黑" panose="020B0503020204020204" pitchFamily="34" charset="-122"/>
+              <a:ea typeface="微软雅黑" panose="020B0503020204020204" pitchFamily="34" charset="-122"/>
+            </a:rPr>
+            <a:t>20201021952《Windows</a:t>
+          </a:r>
+          <a:r>
+            <a:rPr lang="zh-CN" altLang="zh-CN" sz="1000" dirty="0">
+              <a:latin typeface="微软雅黑" panose="020B0503020204020204" pitchFamily="34" charset="-122"/>
+              <a:ea typeface="微软雅黑" panose="020B0503020204020204" pitchFamily="34" charset="-122"/>
+            </a:rPr>
+            <a:t>原理与应用</a:t>
+          </a:r>
+          <a:r>
+            <a:rPr lang="en-US" altLang="zh-CN" sz="1000" dirty="0">
+              <a:latin typeface="微软雅黑" panose="020B0503020204020204" pitchFamily="34" charset="-122"/>
+              <a:ea typeface="微软雅黑" panose="020B0503020204020204" pitchFamily="34" charset="-122"/>
+            </a:rPr>
+            <a:t>》</a:t>
+          </a:r>
+          <a:endParaRPr lang="en-US" sz="1000" dirty="0"/>
         </a:p>
       </dgm:t>
     </dgm:pt>
@@ -6660,7 +6697,7 @@
               <a:latin typeface="微软雅黑" panose="020B0503020204020204" pitchFamily="34" charset="-122"/>
               <a:ea typeface="微软雅黑" panose="020B0503020204020204" pitchFamily="34" charset="-122"/>
             </a:rPr>
-            <a:t>WeChat Group: </a:t>
+            <a:t>QQ group: </a:t>
           </a:r>
           <a:br>
             <a:rPr lang="en-US" altLang="zh-CN" sz="1200" kern="1200" dirty="0">
@@ -6669,13 +6706,62 @@
             </a:rPr>
           </a:br>
           <a:r>
-            <a:rPr lang="en-US" altLang="zh-CN" sz="1200" kern="1200" dirty="0">
+            <a:rPr lang="en-US" altLang="zh-CN" sz="1000" kern="1200" dirty="0">
               <a:latin typeface="微软雅黑" panose="020B0503020204020204" pitchFamily="34" charset="-122"/>
               <a:ea typeface="微软雅黑" panose="020B0503020204020204" pitchFamily="34" charset="-122"/>
             </a:rPr>
-            <a:t>programming windows 2020</a:t>
+            <a:t>20201021076《Windows</a:t>
           </a:r>
-          <a:endParaRPr lang="en-US" sz="1200" kern="1200" dirty="0"/>
+          <a:r>
+            <a:rPr lang="zh-CN" altLang="zh-CN" sz="1000" kern="1200" dirty="0">
+              <a:latin typeface="微软雅黑" panose="020B0503020204020204" pitchFamily="34" charset="-122"/>
+              <a:ea typeface="微软雅黑" panose="020B0503020204020204" pitchFamily="34" charset="-122"/>
+            </a:rPr>
+            <a:t>原理与应用</a:t>
+          </a:r>
+          <a:r>
+            <a:rPr lang="en-US" altLang="zh-CN" sz="1000" kern="1200" dirty="0">
+              <a:latin typeface="微软雅黑" panose="020B0503020204020204" pitchFamily="34" charset="-122"/>
+              <a:ea typeface="微软雅黑" panose="020B0503020204020204" pitchFamily="34" charset="-122"/>
+            </a:rPr>
+            <a:t>》</a:t>
+          </a:r>
+        </a:p>
+        <a:p>
+          <a:pPr marL="0" lvl="0" indent="0" algn="ctr" defTabSz="533400">
+            <a:lnSpc>
+              <a:spcPct val="90000"/>
+            </a:lnSpc>
+            <a:spcBef>
+              <a:spcPct val="0"/>
+            </a:spcBef>
+            <a:spcAft>
+              <a:spcPct val="35000"/>
+            </a:spcAft>
+            <a:buNone/>
+          </a:pPr>
+          <a:r>
+            <a:rPr lang="en-US" altLang="zh-CN" sz="1000" kern="1200" dirty="0">
+              <a:latin typeface="微软雅黑" panose="020B0503020204020204" pitchFamily="34" charset="-122"/>
+              <a:ea typeface="微软雅黑" panose="020B0503020204020204" pitchFamily="34" charset="-122"/>
+            </a:rPr>
+            <a:t>20201021952《Windows</a:t>
+          </a:r>
+          <a:r>
+            <a:rPr lang="zh-CN" altLang="zh-CN" sz="1000" kern="1200" dirty="0">
+              <a:latin typeface="微软雅黑" panose="020B0503020204020204" pitchFamily="34" charset="-122"/>
+              <a:ea typeface="微软雅黑" panose="020B0503020204020204" pitchFamily="34" charset="-122"/>
+            </a:rPr>
+            <a:t>原理与应用</a:t>
+          </a:r>
+          <a:r>
+            <a:rPr lang="en-US" altLang="zh-CN" sz="1000" kern="1200" dirty="0">
+              <a:latin typeface="微软雅黑" panose="020B0503020204020204" pitchFamily="34" charset="-122"/>
+              <a:ea typeface="微软雅黑" panose="020B0503020204020204" pitchFamily="34" charset="-122"/>
+            </a:rPr>
+            <a:t>》</a:t>
+          </a:r>
+          <a:endParaRPr lang="en-US" sz="1000" kern="1200" dirty="0"/>
         </a:p>
       </dsp:txBody>
       <dsp:txXfrm>
@@ -10743,7 +10829,7 @@
           <a:p>
             <a:fld id="{E574AC39-44E6-425E-AF49-CF7D189F346F}" type="datetimeFigureOut">
               <a:rPr lang="en-US" smtClean="0"/>
-              <a:t>9/7/2020</a:t>
+              <a:t>9/9/2020</a:t>
             </a:fld>
             <a:endParaRPr lang="en-US"/>
           </a:p>
@@ -10908,7 +10994,7 @@
           <a:p>
             <a:fld id="{DF2775BC-6312-42C7-B7C5-EA6783C2D9CA}" type="datetimeFigureOut">
               <a:rPr lang="en-US" smtClean="0"/>
-              <a:t>9/7/2020</a:t>
+              <a:t>9/9/2020</a:t>
             </a:fld>
             <a:endParaRPr lang="en-US"/>
           </a:p>
@@ -11719,7 +11805,7 @@
           <a:p>
             <a:fld id="{40FF0622-75E4-48B8-A617-5428CA5926CE}" type="datetimeFigureOut">
               <a:rPr lang="en-US" smtClean="0"/>
-              <a:t>9/7/2020</a:t>
+              <a:t>9/9/2020</a:t>
             </a:fld>
             <a:endParaRPr lang="en-US"/>
           </a:p>
@@ -11992,7 +12078,7 @@
           <a:p>
             <a:fld id="{40FF0622-75E4-48B8-A617-5428CA5926CE}" type="datetimeFigureOut">
               <a:rPr lang="en-US" smtClean="0"/>
-              <a:t>9/7/2020</a:t>
+              <a:t>9/9/2020</a:t>
             </a:fld>
             <a:endParaRPr lang="en-US"/>
           </a:p>
@@ -12118,7 +12204,7 @@
           <a:p>
             <a:fld id="{40FF0622-75E4-48B8-A617-5428CA5926CE}" type="datetimeFigureOut">
               <a:rPr lang="en-US" smtClean="0"/>
-              <a:t>9/7/2020</a:t>
+              <a:t>9/9/2020</a:t>
             </a:fld>
             <a:endParaRPr lang="en-US"/>
           </a:p>
@@ -12312,7 +12398,7 @@
           <a:p>
             <a:fld id="{40FF0622-75E4-48B8-A617-5428CA5926CE}" type="datetimeFigureOut">
               <a:rPr lang="en-US" smtClean="0"/>
-              <a:t>9/7/2020</a:t>
+              <a:t>9/9/2020</a:t>
             </a:fld>
             <a:endParaRPr lang="en-US"/>
           </a:p>
@@ -12785,7 +12871,7 @@
           <a:p>
             <a:fld id="{40FF0622-75E4-48B8-A617-5428CA5926CE}" type="datetimeFigureOut">
               <a:rPr lang="en-US" smtClean="0"/>
-              <a:t>9/7/2020</a:t>
+              <a:t>9/9/2020</a:t>
             </a:fld>
             <a:endParaRPr lang="en-US"/>
           </a:p>
@@ -12911,7 +12997,7 @@
           <a:p>
             <a:fld id="{40FF0622-75E4-48B8-A617-5428CA5926CE}" type="datetimeFigureOut">
               <a:rPr lang="en-US" smtClean="0"/>
-              <a:t>9/7/2020</a:t>
+              <a:t>9/9/2020</a:t>
             </a:fld>
             <a:endParaRPr lang="en-US"/>
           </a:p>
@@ -13199,7 +13285,7 @@
           <a:p>
             <a:fld id="{40FF0622-75E4-48B8-A617-5428CA5926CE}" type="datetimeFigureOut">
               <a:rPr lang="en-US" smtClean="0"/>
-              <a:t>9/7/2020</a:t>
+              <a:t>9/9/2020</a:t>
             </a:fld>
             <a:endParaRPr lang="en-US"/>
           </a:p>
@@ -13950,7 +14036,7 @@
           <a:p>
             <a:fld id="{40FF0622-75E4-48B8-A617-5428CA5926CE}" type="datetimeFigureOut">
               <a:rPr lang="en-US" smtClean="0"/>
-              <a:t>9/7/2020</a:t>
+              <a:t>9/9/2020</a:t>
             </a:fld>
             <a:endParaRPr lang="en-US"/>
           </a:p>
@@ -14794,7 +14880,7 @@
           <a:p>
             <a:fld id="{40FF0622-75E4-48B8-A617-5428CA5926CE}" type="datetimeFigureOut">
               <a:rPr lang="en-US" smtClean="0"/>
-              <a:t>9/7/2020</a:t>
+              <a:t>9/9/2020</a:t>
             </a:fld>
             <a:endParaRPr lang="en-US"/>
           </a:p>
@@ -14962,7 +15048,7 @@
           <a:p>
             <a:fld id="{40FF0622-75E4-48B8-A617-5428CA5926CE}" type="datetimeFigureOut">
               <a:rPr lang="en-US" smtClean="0"/>
-              <a:t>9/7/2020</a:t>
+              <a:t>9/9/2020</a:t>
             </a:fld>
             <a:endParaRPr lang="en-US"/>
           </a:p>
@@ -15140,7 +15226,7 @@
           <a:p>
             <a:fld id="{40FF0622-75E4-48B8-A617-5428CA5926CE}" type="datetimeFigureOut">
               <a:rPr lang="en-US" smtClean="0"/>
-              <a:t>9/7/2020</a:t>
+              <a:t>9/9/2020</a:t>
             </a:fld>
             <a:endParaRPr lang="en-US"/>
           </a:p>
@@ -15309,7 +15395,7 @@
           <a:p>
             <a:fld id="{40FF0622-75E4-48B8-A617-5428CA5926CE}" type="datetimeFigureOut">
               <a:rPr lang="en-US" smtClean="0"/>
-              <a:t>9/7/2020</a:t>
+              <a:t>9/9/2020</a:t>
             </a:fld>
             <a:endParaRPr lang="en-US"/>
           </a:p>
@@ -15553,7 +15639,7 @@
           <a:p>
             <a:fld id="{40FF0622-75E4-48B8-A617-5428CA5926CE}" type="datetimeFigureOut">
               <a:rPr lang="en-US" smtClean="0"/>
-              <a:t>9/7/2020</a:t>
+              <a:t>9/9/2020</a:t>
             </a:fld>
             <a:endParaRPr lang="en-US"/>
           </a:p>
@@ -15842,7 +15928,7 @@
           <a:p>
             <a:fld id="{40FF0622-75E4-48B8-A617-5428CA5926CE}" type="datetimeFigureOut">
               <a:rPr lang="en-US" smtClean="0"/>
-              <a:t>9/7/2020</a:t>
+              <a:t>9/9/2020</a:t>
             </a:fld>
             <a:endParaRPr lang="en-US"/>
           </a:p>
@@ -16277,7 +16363,7 @@
           <a:p>
             <a:fld id="{40FF0622-75E4-48B8-A617-5428CA5926CE}" type="datetimeFigureOut">
               <a:rPr lang="en-US" smtClean="0"/>
-              <a:t>9/7/2020</a:t>
+              <a:t>9/9/2020</a:t>
             </a:fld>
             <a:endParaRPr lang="en-US"/>
           </a:p>
@@ -16394,7 +16480,7 @@
           <a:p>
             <a:fld id="{40FF0622-75E4-48B8-A617-5428CA5926CE}" type="datetimeFigureOut">
               <a:rPr lang="en-US" smtClean="0"/>
-              <a:t>9/7/2020</a:t>
+              <a:t>9/9/2020</a:t>
             </a:fld>
             <a:endParaRPr lang="en-US"/>
           </a:p>
@@ -16489,7 +16575,7 @@
           <a:p>
             <a:fld id="{40FF0622-75E4-48B8-A617-5428CA5926CE}" type="datetimeFigureOut">
               <a:rPr lang="en-US" smtClean="0"/>
-              <a:t>9/7/2020</a:t>
+              <a:t>9/9/2020</a:t>
             </a:fld>
             <a:endParaRPr lang="en-US"/>
           </a:p>
@@ -16767,7 +16853,7 @@
           <a:p>
             <a:fld id="{40FF0622-75E4-48B8-A617-5428CA5926CE}" type="datetimeFigureOut">
               <a:rPr lang="en-US" smtClean="0"/>
-              <a:t>9/7/2020</a:t>
+              <a:t>9/9/2020</a:t>
             </a:fld>
             <a:endParaRPr lang="en-US"/>
           </a:p>
@@ -17041,7 +17127,7 @@
           <a:p>
             <a:fld id="{40FF0622-75E4-48B8-A617-5428CA5926CE}" type="datetimeFigureOut">
               <a:rPr lang="en-US" smtClean="0"/>
-              <a:t>9/7/2020</a:t>
+              <a:t>9/9/2020</a:t>
             </a:fld>
             <a:endParaRPr lang="en-US"/>
           </a:p>
@@ -17675,7 +17761,7 @@
           <a:p>
             <a:fld id="{40FF0622-75E4-48B8-A617-5428CA5926CE}" type="datetimeFigureOut">
               <a:rPr lang="en-US" smtClean="0"/>
-              <a:t>9/7/2020</a:t>
+              <a:t>9/9/2020</a:t>
             </a:fld>
             <a:endParaRPr lang="en-US"/>
           </a:p>
@@ -20105,7 +20191,7 @@
             <p:ph idx="1"/>
             <p:extLst>
               <p:ext uri="{D42A27DB-BD31-4B8C-83A1-F6EECF244321}">
-                <p14:modId xmlns:p14="http://schemas.microsoft.com/office/powerpoint/2010/main" val="3944411710"/>
+                <p14:modId xmlns:p14="http://schemas.microsoft.com/office/powerpoint/2010/main" val="235785329"/>
               </p:ext>
             </p:extLst>
           </p:nvPr>
@@ -20559,7 +20645,7 @@
           <a:graphicData uri="http://schemas.openxmlformats.org/presentationml/2006/ole">
             <mc:AlternateContent xmlns:mc="http://schemas.openxmlformats.org/markup-compatibility/2006">
               <mc:Choice xmlns:v="urn:schemas-microsoft-com:vml" Requires="v">
-                <p:oleObj spid="_x0000_s1088" r:id="rId3" imgW="3790950" imgH="2914650" progId="">
+                <p:oleObj spid="_x0000_s1091" r:id="rId3" imgW="3790950" imgH="2914650" progId="">
                   <p:embed/>
                 </p:oleObj>
               </mc:Choice>
@@ -23847,21 +23933,6 @@
 </file>
 
 <file path=customXml/item1.xml><?xml version="1.0" encoding="utf-8"?>
-<p:properties xmlns:p="http://schemas.microsoft.com/office/2006/metadata/properties" xmlns:xsi="http://www.w3.org/2001/XMLSchema-instance" xmlns:pc="http://schemas.microsoft.com/office/infopath/2007/PartnerControls">
-  <documentManagement/>
-</p:properties>
-</file>
-
-<file path=customXml/item2.xml><?xml version="1.0" encoding="utf-8"?>
-<?mso-contentType ?>
-<FormTemplates xmlns="http://schemas.microsoft.com/sharepoint/v3/contenttype/forms">
-  <Display>DocumentLibraryForm</Display>
-  <Edit>DocumentLibraryForm</Edit>
-  <New>DocumentLibraryForm</New>
-</FormTemplates>
-</file>
-
-<file path=customXml/item3.xml><?xml version="1.0" encoding="utf-8"?>
 <ct:contentTypeSchema xmlns:ct="http://schemas.microsoft.com/office/2006/metadata/contentType" xmlns:ma="http://schemas.microsoft.com/office/2006/metadata/properties/metaAttributes" ct:_="" ma:_="" ma:contentTypeName="Document" ma:contentTypeID="0x0101007C1D5F340F01F94FA2FD29A5E6DC872E" ma:contentTypeVersion="0" ma:contentTypeDescription="Create a new document." ma:contentTypeScope="" ma:versionID="f583bd66513a361a730282b6a794e352">
   <xsd:schema xmlns:xsd="http://www.w3.org/2001/XMLSchema" xmlns:xs="http://www.w3.org/2001/XMLSchema" xmlns:p="http://schemas.microsoft.com/office/2006/metadata/properties" targetNamespace="http://schemas.microsoft.com/office/2006/metadata/properties" ma:root="true" ma:fieldsID="6841151cf538834e171094e4faaf2d73">
     <xsd:element name="properties">
@@ -23975,10 +24046,32 @@
 </ct:contentTypeSchema>
 </file>
 
+<file path=customXml/item2.xml><?xml version="1.0" encoding="utf-8"?>
+<?mso-contentType ?>
+<FormTemplates xmlns="http://schemas.microsoft.com/sharepoint/v3/contenttype/forms">
+  <Display>DocumentLibraryForm</Display>
+  <Edit>DocumentLibraryForm</Edit>
+  <New>DocumentLibraryForm</New>
+</FormTemplates>
+</file>
+
+<file path=customXml/item3.xml><?xml version="1.0" encoding="utf-8"?>
+<p:properties xmlns:p="http://schemas.microsoft.com/office/2006/metadata/properties" xmlns:xsi="http://www.w3.org/2001/XMLSchema-instance" xmlns:pc="http://schemas.microsoft.com/office/infopath/2007/PartnerControls">
+  <documentManagement/>
+</p:properties>
+</file>
+
 <file path=customXml/itemProps1.xml><?xml version="1.0" encoding="utf-8"?>
-<ds:datastoreItem xmlns:ds="http://schemas.openxmlformats.org/officeDocument/2006/customXml" ds:itemID="{CA7F0F3B-1D69-4071-934C-7373F1C638FD}">
+<ds:datastoreItem xmlns:ds="http://schemas.openxmlformats.org/officeDocument/2006/customXml" ds:itemID="{D1FC5151-73AF-4992-B300-816A43C7C293}">
   <ds:schemaRefs>
+    <ds:schemaRef ds:uri="http://schemas.microsoft.com/office/2006/metadata/contentType"/>
+    <ds:schemaRef ds:uri="http://schemas.microsoft.com/office/2006/metadata/properties/metaAttributes"/>
+    <ds:schemaRef ds:uri="http://www.w3.org/2001/XMLSchema"/>
     <ds:schemaRef ds:uri="http://schemas.microsoft.com/office/2006/metadata/properties"/>
+    <ds:schemaRef ds:uri="http://schemas.openxmlformats.org/package/2006/metadata/core-properties"/>
+    <ds:schemaRef ds:uri="http://purl.org/dc/elements/1.1/"/>
+    <ds:schemaRef ds:uri="http://purl.org/dc/terms/"/>
+    <ds:schemaRef ds:uri="http://schemas.microsoft.com/internal/obd"/>
     <ds:schemaRef ds:uri="http://schemas.microsoft.com/office/infopath/2007/PartnerControls"/>
   </ds:schemaRefs>
 </ds:datastoreItem>
@@ -23993,16 +24086,9 @@
 </file>
 
 <file path=customXml/itemProps3.xml><?xml version="1.0" encoding="utf-8"?>
-<ds:datastoreItem xmlns:ds="http://schemas.openxmlformats.org/officeDocument/2006/customXml" ds:itemID="{D1FC5151-73AF-4992-B300-816A43C7C293}">
+<ds:datastoreItem xmlns:ds="http://schemas.openxmlformats.org/officeDocument/2006/customXml" ds:itemID="{CA7F0F3B-1D69-4071-934C-7373F1C638FD}">
   <ds:schemaRefs>
-    <ds:schemaRef ds:uri="http://schemas.microsoft.com/office/2006/metadata/contentType"/>
-    <ds:schemaRef ds:uri="http://schemas.microsoft.com/office/2006/metadata/properties/metaAttributes"/>
-    <ds:schemaRef ds:uri="http://www.w3.org/2001/XMLSchema"/>
     <ds:schemaRef ds:uri="http://schemas.microsoft.com/office/2006/metadata/properties"/>
-    <ds:schemaRef ds:uri="http://schemas.openxmlformats.org/package/2006/metadata/core-properties"/>
-    <ds:schemaRef ds:uri="http://purl.org/dc/elements/1.1/"/>
-    <ds:schemaRef ds:uri="http://purl.org/dc/terms/"/>
-    <ds:schemaRef ds:uri="http://schemas.microsoft.com/internal/obd"/>
     <ds:schemaRef ds:uri="http://schemas.microsoft.com/office/infopath/2007/PartnerControls"/>
   </ds:schemaRefs>
 </ds:datastoreItem>

</xml_diff>